<commit_message>
Deployed f62c1dc to 0.7 with MkDocs 1.1 and mike 1.0.1
</commit_message>
<xml_diff>
--- a/0.7/images/src/helmexgitops.pptx
+++ b/0.7/images/src/helmexgitops.pptx
@@ -197,7 +197,7 @@
           <a:p>
             <a:fld id="{38B78CBE-37FA-D241-BB4C-CAC5D3B25F49}" type="datetimeFigureOut">
               <a:rPr lang="en-US" smtClean="0"/>
-              <a:t>7/27/21</a:t>
+              <a:t>7/28/21</a:t>
             </a:fld>
             <a:endParaRPr lang="en-US"/>
           </a:p>
@@ -611,7 +611,7 @@
           <a:p>
             <a:fld id="{708812C5-0212-FD42-A0D4-E2E8FF4E3AF5}" type="datetime1">
               <a:rPr lang="en-US" smtClean="0"/>
-              <a:t>7/27/21</a:t>
+              <a:t>7/28/21</a:t>
             </a:fld>
             <a:endParaRPr lang="en-US"/>
           </a:p>
@@ -812,7 +812,7 @@
           <a:p>
             <a:fld id="{D232AC6F-41C3-B34B-9BAA-03ED2F3BC0F6}" type="datetime1">
               <a:rPr lang="en-US" smtClean="0"/>
-              <a:t>7/27/21</a:t>
+              <a:t>7/28/21</a:t>
             </a:fld>
             <a:endParaRPr lang="en-US"/>
           </a:p>
@@ -1023,7 +1023,7 @@
           <a:p>
             <a:fld id="{BEE140C2-F440-9D49-95CB-5965D64CC4A2}" type="datetime1">
               <a:rPr lang="en-US" smtClean="0"/>
-              <a:t>7/27/21</a:t>
+              <a:t>7/28/21</a:t>
             </a:fld>
             <a:endParaRPr lang="en-US"/>
           </a:p>
@@ -1224,7 +1224,7 @@
           <a:p>
             <a:fld id="{CC99F980-FB29-FD47-8508-150F73F1E8B0}" type="datetime1">
               <a:rPr lang="en-US" smtClean="0"/>
-              <a:t>7/27/21</a:t>
+              <a:t>7/28/21</a:t>
             </a:fld>
             <a:endParaRPr lang="en-US"/>
           </a:p>
@@ -1502,7 +1502,7 @@
           <a:p>
             <a:fld id="{D4510983-EA22-9643-8AC0-B3C6499B643B}" type="datetime1">
               <a:rPr lang="en-US" smtClean="0"/>
-              <a:t>7/27/21</a:t>
+              <a:t>7/28/21</a:t>
             </a:fld>
             <a:endParaRPr lang="en-US"/>
           </a:p>
@@ -1770,7 +1770,7 @@
           <a:p>
             <a:fld id="{D5A39195-967D-5D4E-8C6A-C99866996458}" type="datetime1">
               <a:rPr lang="en-US" smtClean="0"/>
-              <a:t>7/27/21</a:t>
+              <a:t>7/28/21</a:t>
             </a:fld>
             <a:endParaRPr lang="en-US"/>
           </a:p>
@@ -2185,7 +2185,7 @@
           <a:p>
             <a:fld id="{5AD771E9-C79D-684D-A158-5EB6E92DE947}" type="datetime1">
               <a:rPr lang="en-US" smtClean="0"/>
-              <a:t>7/27/21</a:t>
+              <a:t>7/28/21</a:t>
             </a:fld>
             <a:endParaRPr lang="en-US"/>
           </a:p>
@@ -2329,7 +2329,7 @@
           <a:p>
             <a:fld id="{693CA161-7E4C-5C4B-B799-DB602A0B9806}" type="datetime1">
               <a:rPr lang="en-US" smtClean="0"/>
-              <a:t>7/27/21</a:t>
+              <a:t>7/28/21</a:t>
             </a:fld>
             <a:endParaRPr lang="en-US"/>
           </a:p>
@@ -2445,7 +2445,7 @@
           <a:p>
             <a:fld id="{6D55FDF3-8BB2-6349-A5FA-057F3D78953D}" type="datetime1">
               <a:rPr lang="en-US" smtClean="0"/>
-              <a:t>7/27/21</a:t>
+              <a:t>7/28/21</a:t>
             </a:fld>
             <a:endParaRPr lang="en-US"/>
           </a:p>
@@ -2759,7 +2759,7 @@
           <a:p>
             <a:fld id="{EEDFACC0-3228-BA4B-942E-CEF38B0101FD}" type="datetime1">
               <a:rPr lang="en-US" smtClean="0"/>
-              <a:t>7/27/21</a:t>
+              <a:t>7/28/21</a:t>
             </a:fld>
             <a:endParaRPr lang="en-US"/>
           </a:p>
@@ -3050,7 +3050,7 @@
           <a:p>
             <a:fld id="{07EEEDBE-E24C-D140-B419-6D8D592D0F1C}" type="datetime1">
               <a:rPr lang="en-US" smtClean="0"/>
-              <a:t>7/27/21</a:t>
+              <a:t>7/28/21</a:t>
             </a:fld>
             <a:endParaRPr lang="en-US"/>
           </a:p>
@@ -3294,7 +3294,7 @@
           <a:p>
             <a:fld id="{E05781A2-A5EF-C54C-A3EF-F62483D37EDC}" type="datetime1">
               <a:rPr lang="en-US" smtClean="0"/>
-              <a:t>7/27/21</a:t>
+              <a:t>7/28/21</a:t>
             </a:fld>
             <a:endParaRPr lang="en-US"/>
           </a:p>
@@ -4161,7 +4161,7 @@
         </p:nvSpPr>
         <p:spPr>
           <a:xfrm>
-            <a:off x="1159089" y="1898136"/>
+            <a:off x="1169556" y="2161377"/>
             <a:ext cx="4232951" cy="2199188"/>
           </a:xfrm>
           <a:prstGeom prst="roundRect">
@@ -4228,7 +4228,7 @@
         </p:blipFill>
         <p:spPr>
           <a:xfrm>
-            <a:off x="4288645" y="2000156"/>
+            <a:off x="4299112" y="2263397"/>
             <a:ext cx="904766" cy="904766"/>
           </a:xfrm>
           <a:prstGeom prst="rect">
@@ -4250,7 +4250,7 @@
         </p:nvSpPr>
         <p:spPr>
           <a:xfrm>
-            <a:off x="2039006" y="2535589"/>
+            <a:off x="2049473" y="2798830"/>
             <a:ext cx="1987191" cy="1116277"/>
           </a:xfrm>
           <a:prstGeom prst="foldedCorner">
@@ -4327,7 +4327,7 @@
         </p:nvCxnSpPr>
         <p:spPr>
           <a:xfrm flipV="1">
-            <a:off x="1271752" y="3651868"/>
+            <a:off x="1282219" y="3915109"/>
             <a:ext cx="1776250" cy="684392"/>
           </a:xfrm>
           <a:prstGeom prst="bentConnector3">
@@ -4335,7 +4335,7 @@
               <a:gd name="adj1" fmla="val 99704"/>
             </a:avLst>
           </a:prstGeom>
-          <a:ln>
+          <a:ln w="19050">
             <a:headEnd w="lg" len="lg"/>
             <a:tailEnd type="stealth" w="lg" len="lg"/>
           </a:ln>
@@ -4369,8 +4369,8 @@
         </p:nvSpPr>
         <p:spPr>
           <a:xfrm>
-            <a:off x="1345324" y="4357987"/>
-            <a:ext cx="1629105" cy="923330"/>
+            <a:off x="1101081" y="4640033"/>
+            <a:ext cx="2430394" cy="646331"/>
           </a:xfrm>
           <a:prstGeom prst="rect">
             <a:avLst/>
@@ -4386,7 +4386,7 @@
             <a:pPr algn="ctr"/>
             <a:r>
               <a:rPr lang="en-US" dirty="0"/>
-              <a:t>Dark launch candidate with experiment</a:t>
+              <a:t>b) Create candidate &amp; experiment</a:t>
             </a:r>
           </a:p>
         </p:txBody>
@@ -4409,16 +4409,16 @@
         </p:nvCxnSpPr>
         <p:spPr>
           <a:xfrm rot="5400000" flipH="1">
-            <a:off x="6099255" y="1020670"/>
-            <a:ext cx="356754" cy="4502870"/>
+            <a:off x="6236109" y="1157525"/>
+            <a:ext cx="93513" cy="4492403"/>
           </a:xfrm>
           <a:prstGeom prst="bentConnector4">
             <a:avLst>
-              <a:gd name="adj1" fmla="val -329227"/>
-              <a:gd name="adj2" fmla="val 64185"/>
+              <a:gd name="adj1" fmla="val -1278487"/>
+              <a:gd name="adj2" fmla="val 63048"/>
             </a:avLst>
           </a:prstGeom>
-          <a:ln>
+          <a:ln w="19050">
             <a:headEnd w="lg" len="lg"/>
             <a:tailEnd type="stealth" w="lg" len="lg"/>
           </a:ln>
@@ -4507,9 +4507,7 @@
           </a:prstGeom>
           <a:ln w="38100">
             <a:solidFill>
-              <a:schemeClr val="accent4">
-                <a:lumMod val="50000"/>
-              </a:schemeClr>
+              <a:srgbClr val="C00000"/>
             </a:solidFill>
             <a:tailEnd type="triangle"/>
           </a:ln>
@@ -4543,8 +4541,8 @@
         </p:nvSpPr>
         <p:spPr>
           <a:xfrm>
-            <a:off x="5654487" y="4656789"/>
-            <a:ext cx="2874580" cy="646331"/>
+            <a:off x="5612447" y="4656789"/>
+            <a:ext cx="3100956" cy="369332"/>
           </a:xfrm>
           <a:prstGeom prst="rect">
             <a:avLst/>
@@ -4560,7 +4558,7 @@
             <a:pPr algn="ctr"/>
             <a:r>
               <a:rPr lang="en-US" dirty="0"/>
-              <a:t>Promote winning version found by the experiment</a:t>
+              <a:t>c) Promote winning version</a:t>
             </a:r>
           </a:p>
         </p:txBody>
@@ -4601,6 +4599,85 @@
           </a:prstGeom>
         </p:spPr>
       </p:pic>
+      <p:cxnSp>
+        <p:nvCxnSpPr>
+          <p:cNvPr id="20" name="Elbow Connector 19">
+            <a:extLst>
+              <a:ext uri="{FF2B5EF4-FFF2-40B4-BE49-F238E27FC236}">
+                <a16:creationId xmlns:a16="http://schemas.microsoft.com/office/drawing/2014/main" id="{8A42C167-9F04-3048-AF7C-BF775FC7549E}"/>
+              </a:ext>
+            </a:extLst>
+          </p:cNvPr>
+          <p:cNvCxnSpPr>
+            <a:cxnSpLocks/>
+            <a:endCxn id="15" idx="0"/>
+          </p:cNvCxnSpPr>
+          <p:nvPr/>
+        </p:nvCxnSpPr>
+        <p:spPr>
+          <a:xfrm>
+            <a:off x="1219087" y="2016675"/>
+            <a:ext cx="1823982" cy="782155"/>
+          </a:xfrm>
+          <a:prstGeom prst="bentConnector2">
+            <a:avLst/>
+          </a:prstGeom>
+          <a:ln w="19050">
+            <a:headEnd w="lg" len="lg"/>
+            <a:tailEnd type="stealth" w="lg" len="lg"/>
+          </a:ln>
+        </p:spPr>
+        <p:style>
+          <a:lnRef idx="1">
+            <a:schemeClr val="accent1"/>
+          </a:lnRef>
+          <a:fillRef idx="0">
+            <a:schemeClr val="accent1"/>
+          </a:fillRef>
+          <a:effectRef idx="0">
+            <a:schemeClr val="accent1"/>
+          </a:effectRef>
+          <a:fontRef idx="minor">
+            <a:schemeClr val="tx1"/>
+          </a:fontRef>
+        </p:style>
+      </p:cxnSp>
+      <p:sp>
+        <p:nvSpPr>
+          <p:cNvPr id="23" name="TextBox 22">
+            <a:extLst>
+              <a:ext uri="{FF2B5EF4-FFF2-40B4-BE49-F238E27FC236}">
+                <a16:creationId xmlns:a16="http://schemas.microsoft.com/office/drawing/2014/main" id="{C306DCE8-2EAC-524F-99A6-2A43862C169B}"/>
+              </a:ext>
+            </a:extLst>
+          </p:cNvPr>
+          <p:cNvSpPr txBox="1"/>
+          <p:nvPr/>
+        </p:nvSpPr>
+        <p:spPr>
+          <a:xfrm>
+            <a:off x="1134048" y="1618699"/>
+            <a:ext cx="2176710" cy="369332"/>
+          </a:xfrm>
+          <a:prstGeom prst="rect">
+            <a:avLst/>
+          </a:prstGeom>
+          <a:noFill/>
+        </p:spPr>
+        <p:txBody>
+          <a:bodyPr wrap="square" rtlCol="0">
+            <a:spAutoFit/>
+          </a:bodyPr>
+          <a:lstStyle/>
+          <a:p>
+            <a:pPr algn="ctr"/>
+            <a:r>
+              <a:rPr lang="en-US" dirty="0"/>
+              <a:t>a) Create baseline</a:t>
+            </a:r>
+          </a:p>
+        </p:txBody>
+      </p:sp>
     </p:spTree>
     <p:extLst>
       <p:ext uri="{BB962C8B-B14F-4D97-AF65-F5344CB8AC3E}">

</xml_diff>